<commit_message>
YAML files for K8
</commit_message>
<xml_diff>
--- a/Capstone Project.pptx
+++ b/Capstone Project.pptx
@@ -90,7 +90,7 @@
         <p:txBody>
           <a:bodyPr/>
           <a:p>
-            <a:fld id="{65989B7E-972A-4363-AC7F-36D29DDAC2B0}" type="slidenum">
+            <a:fld id="{E91ECF6B-1E82-49AD-8548-BFF86D142EFD}" type="slidenum">
               <a:t>&lt;#&gt;</a:t>
             </a:fld>
           </a:p>
@@ -299,7 +299,7 @@
         <p:txBody>
           <a:bodyPr/>
           <a:p>
-            <a:fld id="{AC873CC0-5851-494C-8C71-6EAACF70E5F8}" type="slidenum">
+            <a:fld id="{9476BB93-FA61-4BA6-8AA6-961625F84AB5}" type="slidenum">
               <a:t>&lt;#&gt;</a:t>
             </a:fld>
           </a:p>
@@ -594,7 +594,7 @@
         <p:txBody>
           <a:bodyPr/>
           <a:p>
-            <a:fld id="{FDA3B86D-A07D-49F7-AEBA-C6DFCD9EE1D8}" type="slidenum">
+            <a:fld id="{78B92854-E624-4386-AA60-E5777E967858}" type="slidenum">
               <a:t>&lt;#&gt;</a:t>
             </a:fld>
           </a:p>
@@ -975,7 +975,7 @@
         <p:txBody>
           <a:bodyPr/>
           <a:p>
-            <a:fld id="{C4338249-1D91-4235-B53F-413BA59CA988}" type="slidenum">
+            <a:fld id="{02DF6B90-121C-4997-B127-DE0E76EF95C8}" type="slidenum">
               <a:t>&lt;#&gt;</a:t>
             </a:fld>
           </a:p>
@@ -1058,7 +1058,7 @@
         <p:txBody>
           <a:bodyPr/>
           <a:p>
-            <a:fld id="{33319E36-68A1-43BC-98C8-A307D5E38293}" type="slidenum">
+            <a:fld id="{CA2E8A56-FB31-4D18-9B84-F729BFFE14D8}" type="slidenum">
               <a:t>&lt;#&gt;</a:t>
             </a:fld>
           </a:p>
@@ -1221,7 +1221,7 @@
         <p:txBody>
           <a:bodyPr/>
           <a:p>
-            <a:fld id="{408222E3-3211-4B1C-8D6D-37801D99375C}" type="slidenum">
+            <a:fld id="{C11DCD53-0758-40CF-8D76-6467E4EA5AA3}" type="slidenum">
               <a:t>&lt;#&gt;</a:t>
             </a:fld>
           </a:p>
@@ -1387,7 +1387,7 @@
         <p:txBody>
           <a:bodyPr/>
           <a:p>
-            <a:fld id="{DFD6EFF2-AC79-42ED-AC47-2C351FBF70BF}" type="slidenum">
+            <a:fld id="{DFFFED92-B062-403F-BD9D-617C4AC8A6BC}" type="slidenum">
               <a:t>&lt;#&gt;</a:t>
             </a:fld>
           </a:p>
@@ -1596,7 +1596,7 @@
         <p:txBody>
           <a:bodyPr/>
           <a:p>
-            <a:fld id="{E3F90E23-C45F-4510-8E1A-7D1346ACFB71}" type="slidenum">
+            <a:fld id="{97DEF15C-FBE7-4046-9A52-66E0FF485350}" type="slidenum">
               <a:t>&lt;#&gt;</a:t>
             </a:fld>
           </a:p>
@@ -1719,7 +1719,7 @@
         <p:txBody>
           <a:bodyPr/>
           <a:p>
-            <a:fld id="{B241E87C-D1E5-4AB8-B309-DFD07BE72612}" type="slidenum">
+            <a:fld id="{CE36D655-F68D-47A9-A807-E2356C1BF389}" type="slidenum">
               <a:t>&lt;#&gt;</a:t>
             </a:fld>
           </a:p>
@@ -1840,7 +1840,7 @@
         <p:txBody>
           <a:bodyPr/>
           <a:p>
-            <a:fld id="{B1D7E5C8-C4CC-4D70-AEC6-935019DA66EB}" type="slidenum">
+            <a:fld id="{9F10D453-B31A-4BFD-BB3F-CB5BCB3970E7}" type="slidenum">
               <a:t>&lt;#&gt;</a:t>
             </a:fld>
           </a:p>
@@ -2092,7 +2092,7 @@
         <p:txBody>
           <a:bodyPr/>
           <a:p>
-            <a:fld id="{EAF3E600-73DC-4EA3-A839-44FEB33330D7}" type="slidenum">
+            <a:fld id="{349F687D-E94D-4644-8F1B-96D6E363538B}" type="slidenum">
               <a:t>&lt;#&gt;</a:t>
             </a:fld>
           </a:p>
@@ -2255,7 +2255,7 @@
         <p:txBody>
           <a:bodyPr/>
           <a:p>
-            <a:fld id="{4D440A8D-FE37-4669-9750-F82FEFE214EE}" type="slidenum">
+            <a:fld id="{23FD2D32-CE0A-4563-9354-3B9C8FBD4A18}" type="slidenum">
               <a:t>&lt;#&gt;</a:t>
             </a:fld>
           </a:p>
@@ -2507,7 +2507,7 @@
         <p:txBody>
           <a:bodyPr/>
           <a:p>
-            <a:fld id="{3242853E-AA94-412D-A346-182D19BC6173}" type="slidenum">
+            <a:fld id="{48B50878-05E2-4F48-847E-C79093FACFA7}" type="slidenum">
               <a:t>&lt;#&gt;</a:t>
             </a:fld>
           </a:p>
@@ -2759,7 +2759,7 @@
         <p:txBody>
           <a:bodyPr/>
           <a:p>
-            <a:fld id="{22C5A41D-33AD-436C-918A-39A876EB574D}" type="slidenum">
+            <a:fld id="{FE15690C-8CDF-4820-B1C2-FEAAFA09B229}" type="slidenum">
               <a:t>&lt;#&gt;</a:t>
             </a:fld>
           </a:p>
@@ -2968,7 +2968,7 @@
         <p:txBody>
           <a:bodyPr/>
           <a:p>
-            <a:fld id="{6FD88EA6-8217-411C-9956-36A0CC367BAA}" type="slidenum">
+            <a:fld id="{C5DDF83C-CD55-405A-914E-1DC1AB8A289C}" type="slidenum">
               <a:t>&lt;#&gt;</a:t>
             </a:fld>
           </a:p>
@@ -3263,7 +3263,7 @@
         <p:txBody>
           <a:bodyPr/>
           <a:p>
-            <a:fld id="{E5671F33-B878-49BB-BBBC-633AA0A36D1E}" type="slidenum">
+            <a:fld id="{6F5F7BD8-71A4-4E7E-8031-DD1EC732532D}" type="slidenum">
               <a:t>&lt;#&gt;</a:t>
             </a:fld>
           </a:p>
@@ -3644,7 +3644,7 @@
         <p:txBody>
           <a:bodyPr/>
           <a:p>
-            <a:fld id="{364FEF6B-5CFF-4122-A3EE-64C48AD0542E}" type="slidenum">
+            <a:fld id="{DB62F82D-CDC6-42EF-BB3A-21C7ED52EFDA}" type="slidenum">
               <a:t>&lt;#&gt;</a:t>
             </a:fld>
           </a:p>
@@ -3810,7 +3810,7 @@
         <p:txBody>
           <a:bodyPr/>
           <a:p>
-            <a:fld id="{C4A6A225-4461-49DD-B498-72DEC37FC135}" type="slidenum">
+            <a:fld id="{1ACFC06F-E7C6-46F5-8C87-454FC2DF08DB}" type="slidenum">
               <a:t>&lt;#&gt;</a:t>
             </a:fld>
           </a:p>
@@ -4019,7 +4019,7 @@
         <p:txBody>
           <a:bodyPr/>
           <a:p>
-            <a:fld id="{F184FD2A-9CF0-4D87-BBEB-34CA90738776}" type="slidenum">
+            <a:fld id="{21A4CD74-35CD-4F71-916B-01C2A5569680}" type="slidenum">
               <a:t>&lt;#&gt;</a:t>
             </a:fld>
           </a:p>
@@ -4142,7 +4142,7 @@
         <p:txBody>
           <a:bodyPr/>
           <a:p>
-            <a:fld id="{D0201B7B-6CB8-4CF7-A5D6-BD5930E42E1E}" type="slidenum">
+            <a:fld id="{8139E688-04CE-488C-8653-452E066AD0EA}" type="slidenum">
               <a:t>&lt;#&gt;</a:t>
             </a:fld>
           </a:p>
@@ -4263,7 +4263,7 @@
         <p:txBody>
           <a:bodyPr/>
           <a:p>
-            <a:fld id="{43A6F71C-2776-4626-8445-77585C0B7615}" type="slidenum">
+            <a:fld id="{6CFD8814-6256-4417-947A-CD3A8AD61060}" type="slidenum">
               <a:t>&lt;#&gt;</a:t>
             </a:fld>
           </a:p>
@@ -4515,7 +4515,7 @@
         <p:txBody>
           <a:bodyPr/>
           <a:p>
-            <a:fld id="{F36C2BBA-AEBB-4A18-8DD2-A45006CE3125}" type="slidenum">
+            <a:fld id="{8E93502A-AF63-4735-B773-276D275672EE}" type="slidenum">
               <a:t>&lt;#&gt;</a:t>
             </a:fld>
           </a:p>
@@ -4767,7 +4767,7 @@
         <p:txBody>
           <a:bodyPr/>
           <a:p>
-            <a:fld id="{4410B644-B7C9-4740-8332-2400EB01678F}" type="slidenum">
+            <a:fld id="{AF4E54E0-03FA-424F-A3E6-A7FCC358A2AD}" type="slidenum">
               <a:t>&lt;#&gt;</a:t>
             </a:fld>
           </a:p>
@@ -5019,7 +5019,7 @@
         <p:txBody>
           <a:bodyPr/>
           <a:p>
-            <a:fld id="{CC83E209-3A3E-4711-8920-CEC76124B112}" type="slidenum">
+            <a:fld id="{0A745F31-A18B-4C0B-B82D-2F640B0F992D}" type="slidenum">
               <a:t>&lt;#&gt;</a:t>
             </a:fld>
           </a:p>
@@ -5082,287 +5082,13 @@
             <a:spLocks noGrp="1"/>
           </p:cNvSpPr>
           <p:nvPr>
-            <p:ph type="title"/>
-          </p:nvPr>
-        </p:nvSpPr>
-        <p:spPr>
-          <a:xfrm>
-            <a:off x="609480" y="273600"/>
-            <a:ext cx="10972080" cy="1144440"/>
-          </a:xfrm>
-          <a:prstGeom prst="rect">
-            <a:avLst/>
-          </a:prstGeom>
-          <a:noFill/>
-          <a:ln w="0">
-            <a:noFill/>
-          </a:ln>
-        </p:spPr>
-        <p:txBody>
-          <a:bodyPr lIns="0" rIns="0" tIns="0" bIns="0" anchor="ctr">
-            <a:noAutofit/>
-          </a:bodyPr>
-          <a:p>
-            <a:pPr indent="0">
-              <a:buNone/>
-            </a:pPr>
-            <a:r>
-              <a:rPr b="0" lang="en-IN" sz="1800" spc="-1" strike="noStrike">
-                <a:solidFill>
-                  <a:srgbClr val="000000"/>
-                </a:solidFill>
-                <a:latin typeface="Arial"/>
-              </a:rPr>
-              <a:t>Click to edit the title text format</a:t>
-            </a:r>
-            <a:endParaRPr b="0" lang="en-IN" sz="1800" spc="-1" strike="noStrike">
-              <a:solidFill>
-                <a:srgbClr val="000000"/>
-              </a:solidFill>
-              <a:latin typeface="Arial"/>
-            </a:endParaRPr>
-          </a:p>
-        </p:txBody>
-      </p:sp>
-      <p:sp>
-        <p:nvSpPr>
-          <p:cNvPr id="1" name="PlaceHolder 2"/>
-          <p:cNvSpPr>
-            <a:spLocks noGrp="1"/>
-          </p:cNvSpPr>
-          <p:nvPr>
-            <p:ph type="body"/>
-          </p:nvPr>
-        </p:nvSpPr>
-        <p:spPr>
-          <a:xfrm>
-            <a:off x="609480" y="1604520"/>
-            <a:ext cx="10972080" cy="3976920"/>
-          </a:xfrm>
-          <a:prstGeom prst="rect">
-            <a:avLst/>
-          </a:prstGeom>
-          <a:noFill/>
-          <a:ln w="0">
-            <a:noFill/>
-          </a:ln>
-        </p:spPr>
-        <p:txBody>
-          <a:bodyPr lIns="0" rIns="0" tIns="0" bIns="0" anchor="t">
-            <a:normAutofit/>
-          </a:bodyPr>
-          <a:p>
-            <a:pPr marL="432000" indent="-324000">
-              <a:spcBef>
-                <a:spcPts val="1417"/>
-              </a:spcBef>
-              <a:buClr>
-                <a:srgbClr val="000000"/>
-              </a:buClr>
-              <a:buSzPct val="45000"/>
-              <a:buFont typeface="Wingdings" charset="2"/>
-              <a:buChar char=""/>
-            </a:pPr>
-            <a:r>
-              <a:rPr b="0" lang="en-IN" sz="1800" spc="-1" strike="noStrike">
-                <a:solidFill>
-                  <a:srgbClr val="000000"/>
-                </a:solidFill>
-                <a:latin typeface="Arial"/>
-              </a:rPr>
-              <a:t>Click to edit the outline text format</a:t>
-            </a:r>
-            <a:endParaRPr b="0" lang="en-IN" sz="1800" spc="-1" strike="noStrike">
-              <a:solidFill>
-                <a:srgbClr val="000000"/>
-              </a:solidFill>
-              <a:latin typeface="Arial"/>
-            </a:endParaRPr>
-          </a:p>
-          <a:p>
-            <a:pPr lvl="1" marL="864000" indent="-324000">
-              <a:spcBef>
-                <a:spcPts val="1134"/>
-              </a:spcBef>
-              <a:buClr>
-                <a:srgbClr val="000000"/>
-              </a:buClr>
-              <a:buSzPct val="75000"/>
-              <a:buFont typeface="Symbol" charset="2"/>
-              <a:buChar char=""/>
-            </a:pPr>
-            <a:r>
-              <a:rPr b="0" lang="en-IN" sz="1800" spc="-1" strike="noStrike">
-                <a:solidFill>
-                  <a:srgbClr val="000000"/>
-                </a:solidFill>
-                <a:latin typeface="Arial"/>
-              </a:rPr>
-              <a:t>Second Outline Level</a:t>
-            </a:r>
-            <a:endParaRPr b="0" lang="en-IN" sz="1800" spc="-1" strike="noStrike">
-              <a:solidFill>
-                <a:srgbClr val="000000"/>
-              </a:solidFill>
-              <a:latin typeface="Arial"/>
-            </a:endParaRPr>
-          </a:p>
-          <a:p>
-            <a:pPr lvl="2" marL="1296000" indent="-288000">
-              <a:spcBef>
-                <a:spcPts val="850"/>
-              </a:spcBef>
-              <a:buClr>
-                <a:srgbClr val="000000"/>
-              </a:buClr>
-              <a:buSzPct val="45000"/>
-              <a:buFont typeface="Wingdings" charset="2"/>
-              <a:buChar char=""/>
-            </a:pPr>
-            <a:r>
-              <a:rPr b="0" lang="en-IN" sz="1800" spc="-1" strike="noStrike">
-                <a:solidFill>
-                  <a:srgbClr val="000000"/>
-                </a:solidFill>
-                <a:latin typeface="Arial"/>
-              </a:rPr>
-              <a:t>Third Outline Level</a:t>
-            </a:r>
-            <a:endParaRPr b="0" lang="en-IN" sz="1800" spc="-1" strike="noStrike">
-              <a:solidFill>
-                <a:srgbClr val="000000"/>
-              </a:solidFill>
-              <a:latin typeface="Arial"/>
-            </a:endParaRPr>
-          </a:p>
-          <a:p>
-            <a:pPr lvl="3" marL="1728000" indent="-216000">
-              <a:spcBef>
-                <a:spcPts val="567"/>
-              </a:spcBef>
-              <a:buClr>
-                <a:srgbClr val="000000"/>
-              </a:buClr>
-              <a:buSzPct val="75000"/>
-              <a:buFont typeface="Symbol" charset="2"/>
-              <a:buChar char=""/>
-            </a:pPr>
-            <a:r>
-              <a:rPr b="0" lang="en-IN" sz="1800" spc="-1" strike="noStrike">
-                <a:solidFill>
-                  <a:srgbClr val="000000"/>
-                </a:solidFill>
-                <a:latin typeface="Arial"/>
-              </a:rPr>
-              <a:t>Fourth Outline Level</a:t>
-            </a:r>
-            <a:endParaRPr b="0" lang="en-IN" sz="1800" spc="-1" strike="noStrike">
-              <a:solidFill>
-                <a:srgbClr val="000000"/>
-              </a:solidFill>
-              <a:latin typeface="Arial"/>
-            </a:endParaRPr>
-          </a:p>
-          <a:p>
-            <a:pPr lvl="4" marL="2160000" indent="-216000">
-              <a:spcBef>
-                <a:spcPts val="283"/>
-              </a:spcBef>
-              <a:buClr>
-                <a:srgbClr val="000000"/>
-              </a:buClr>
-              <a:buSzPct val="45000"/>
-              <a:buFont typeface="Wingdings" charset="2"/>
-              <a:buChar char=""/>
-            </a:pPr>
-            <a:r>
-              <a:rPr b="0" lang="en-IN" sz="1800" spc="-1" strike="noStrike">
-                <a:solidFill>
-                  <a:srgbClr val="000000"/>
-                </a:solidFill>
-                <a:latin typeface="Arial"/>
-              </a:rPr>
-              <a:t>Fifth Outline Level</a:t>
-            </a:r>
-            <a:endParaRPr b="0" lang="en-IN" sz="1800" spc="-1" strike="noStrike">
-              <a:solidFill>
-                <a:srgbClr val="000000"/>
-              </a:solidFill>
-              <a:latin typeface="Arial"/>
-            </a:endParaRPr>
-          </a:p>
-          <a:p>
-            <a:pPr lvl="5" marL="2592000" indent="-216000">
-              <a:spcBef>
-                <a:spcPts val="283"/>
-              </a:spcBef>
-              <a:buClr>
-                <a:srgbClr val="000000"/>
-              </a:buClr>
-              <a:buSzPct val="45000"/>
-              <a:buFont typeface="Wingdings" charset="2"/>
-              <a:buChar char=""/>
-            </a:pPr>
-            <a:r>
-              <a:rPr b="0" lang="en-IN" sz="1800" spc="-1" strike="noStrike">
-                <a:solidFill>
-                  <a:srgbClr val="000000"/>
-                </a:solidFill>
-                <a:latin typeface="Arial"/>
-              </a:rPr>
-              <a:t>Sixth Outline Level</a:t>
-            </a:r>
-            <a:endParaRPr b="0" lang="en-IN" sz="1800" spc="-1" strike="noStrike">
-              <a:solidFill>
-                <a:srgbClr val="000000"/>
-              </a:solidFill>
-              <a:latin typeface="Arial"/>
-            </a:endParaRPr>
-          </a:p>
-          <a:p>
-            <a:pPr lvl="6" marL="3024000" indent="-216000">
-              <a:spcBef>
-                <a:spcPts val="283"/>
-              </a:spcBef>
-              <a:buClr>
-                <a:srgbClr val="000000"/>
-              </a:buClr>
-              <a:buSzPct val="45000"/>
-              <a:buFont typeface="Wingdings" charset="2"/>
-              <a:buChar char=""/>
-            </a:pPr>
-            <a:r>
-              <a:rPr b="0" lang="en-IN" sz="1800" spc="-1" strike="noStrike">
-                <a:solidFill>
-                  <a:srgbClr val="000000"/>
-                </a:solidFill>
-                <a:latin typeface="Arial"/>
-              </a:rPr>
-              <a:t>Seventh Outline Level</a:t>
-            </a:r>
-            <a:endParaRPr b="0" lang="en-IN" sz="1800" spc="-1" strike="noStrike">
-              <a:solidFill>
-                <a:srgbClr val="000000"/>
-              </a:solidFill>
-              <a:latin typeface="Arial"/>
-            </a:endParaRPr>
-          </a:p>
-        </p:txBody>
-      </p:sp>
-      <p:sp>
-        <p:nvSpPr>
-          <p:cNvPr id="2" name="PlaceHolder 3"/>
-          <p:cNvSpPr>
-            <a:spLocks noGrp="1"/>
-          </p:cNvSpPr>
-          <p:nvPr>
             <p:ph type="ftr" idx="1"/>
           </p:nvPr>
         </p:nvSpPr>
         <p:spPr>
           <a:xfrm>
             <a:off x="4038480" y="6356520"/>
-            <a:ext cx="4113720" cy="363960"/>
+            <a:ext cx="4113360" cy="363600"/>
           </a:xfrm>
           <a:prstGeom prst="rect">
             <a:avLst/>
@@ -5410,7 +5136,7 @@
                 </a:solidFill>
                 <a:latin typeface="Times New Roman"/>
               </a:rPr>
-              <a:t>&lt;footer&gt;</a:t>
+              <a:t> </a:t>
             </a:r>
             <a:endParaRPr b="0" lang="en-IN" sz="1400" spc="-1" strike="noStrike">
               <a:solidFill>
@@ -5423,7 +5149,7 @@
       </p:sp>
       <p:sp>
         <p:nvSpPr>
-          <p:cNvPr id="3" name="PlaceHolder 4"/>
+          <p:cNvPr id="1" name="PlaceHolder 2"/>
           <p:cNvSpPr>
             <a:spLocks noGrp="1"/>
           </p:cNvSpPr>
@@ -5434,7 +5160,7 @@
         <p:spPr>
           <a:xfrm>
             <a:off x="8610480" y="6356520"/>
-            <a:ext cx="2742120" cy="363960"/>
+            <a:ext cx="2741760" cy="363600"/>
           </a:xfrm>
           <a:prstGeom prst="rect">
             <a:avLst/>
@@ -5475,14 +5201,14 @@
                 <a:tab algn="l" pos="0"/>
               </a:tabLst>
             </a:pPr>
-            <a:fld id="{A81A5590-B9E4-4B53-93F9-31E4D98B76E5}" type="slidenum">
+            <a:fld id="{2FA1AEBF-422F-48D6-B8E4-C400E54FB386}" type="slidenum">
               <a:rPr b="0" lang="en-IN" sz="1200" spc="-1" strike="noStrike">
                 <a:solidFill>
                   <a:srgbClr val="8b8b8b"/>
                 </a:solidFill>
                 <a:latin typeface="Calibri"/>
               </a:rPr>
-              <a:t>&lt;number&gt;</a:t>
+              <a:t>12</a:t>
             </a:fld>
             <a:endParaRPr b="0" lang="en-IN" sz="1200" spc="-1" strike="noStrike">
               <a:solidFill>
@@ -5495,7 +5221,7 @@
       </p:sp>
       <p:sp>
         <p:nvSpPr>
-          <p:cNvPr id="4" name="PlaceHolder 5"/>
+          <p:cNvPr id="2" name="PlaceHolder 3"/>
           <p:cNvSpPr>
             <a:spLocks noGrp="1"/>
           </p:cNvSpPr>
@@ -5506,7 +5232,7 @@
         <p:spPr>
           <a:xfrm>
             <a:off x="838080" y="6356520"/>
-            <a:ext cx="2742120" cy="363960"/>
+            <a:ext cx="2741760" cy="363600"/>
           </a:xfrm>
           <a:prstGeom prst="rect">
             <a:avLst/>
@@ -5542,13 +5268,287 @@
                 </a:solidFill>
                 <a:latin typeface="Times New Roman"/>
               </a:rPr>
-              <a:t>&lt;date/time&gt;</a:t>
+              <a:t> </a:t>
             </a:r>
             <a:endParaRPr b="0" lang="en-IN" sz="1400" spc="-1" strike="noStrike">
               <a:solidFill>
                 <a:srgbClr val="000000"/>
               </a:solidFill>
               <a:latin typeface="Times New Roman"/>
+            </a:endParaRPr>
+          </a:p>
+        </p:txBody>
+      </p:sp>
+      <p:sp>
+        <p:nvSpPr>
+          <p:cNvPr id="3" name="PlaceHolder 4"/>
+          <p:cNvSpPr>
+            <a:spLocks noGrp="1"/>
+          </p:cNvSpPr>
+          <p:nvPr>
+            <p:ph type="title"/>
+          </p:nvPr>
+        </p:nvSpPr>
+        <p:spPr>
+          <a:xfrm>
+            <a:off x="609480" y="273600"/>
+            <a:ext cx="10972440" cy="1144800"/>
+          </a:xfrm>
+          <a:prstGeom prst="rect">
+            <a:avLst/>
+          </a:prstGeom>
+          <a:noFill/>
+          <a:ln w="0">
+            <a:noFill/>
+          </a:ln>
+        </p:spPr>
+        <p:txBody>
+          <a:bodyPr lIns="0" rIns="0" tIns="0" bIns="0" anchor="ctr">
+            <a:noAutofit/>
+          </a:bodyPr>
+          <a:p>
+            <a:pPr indent="0" algn="ctr">
+              <a:buNone/>
+            </a:pPr>
+            <a:r>
+              <a:rPr b="0" lang="en-IN" sz="4400" spc="-1" strike="noStrike">
+                <a:solidFill>
+                  <a:srgbClr val="000000"/>
+                </a:solidFill>
+                <a:latin typeface="Arial"/>
+              </a:rPr>
+              <a:t>Click to edit the title text format</a:t>
+            </a:r>
+            <a:endParaRPr b="0" lang="en-IN" sz="4400" spc="-1" strike="noStrike">
+              <a:solidFill>
+                <a:srgbClr val="000000"/>
+              </a:solidFill>
+              <a:latin typeface="Arial"/>
+            </a:endParaRPr>
+          </a:p>
+        </p:txBody>
+      </p:sp>
+      <p:sp>
+        <p:nvSpPr>
+          <p:cNvPr id="4" name="PlaceHolder 5"/>
+          <p:cNvSpPr>
+            <a:spLocks noGrp="1"/>
+          </p:cNvSpPr>
+          <p:nvPr>
+            <p:ph type="body"/>
+          </p:nvPr>
+        </p:nvSpPr>
+        <p:spPr>
+          <a:xfrm>
+            <a:off x="609480" y="1604520"/>
+            <a:ext cx="10972440" cy="3977280"/>
+          </a:xfrm>
+          <a:prstGeom prst="rect">
+            <a:avLst/>
+          </a:prstGeom>
+          <a:noFill/>
+          <a:ln w="0">
+            <a:noFill/>
+          </a:ln>
+        </p:spPr>
+        <p:txBody>
+          <a:bodyPr lIns="0" rIns="0" tIns="0" bIns="0" anchor="t">
+            <a:normAutofit/>
+          </a:bodyPr>
+          <a:p>
+            <a:pPr marL="432000" indent="-324000">
+              <a:spcBef>
+                <a:spcPts val="1417"/>
+              </a:spcBef>
+              <a:buClr>
+                <a:srgbClr val="000000"/>
+              </a:buClr>
+              <a:buSzPct val="45000"/>
+              <a:buFont typeface="Wingdings" charset="2"/>
+              <a:buChar char=""/>
+            </a:pPr>
+            <a:r>
+              <a:rPr b="0" lang="en-IN" sz="3200" spc="-1" strike="noStrike">
+                <a:solidFill>
+                  <a:srgbClr val="000000"/>
+                </a:solidFill>
+                <a:latin typeface="Arial"/>
+              </a:rPr>
+              <a:t>Click to edit the outline text format</a:t>
+            </a:r>
+            <a:endParaRPr b="0" lang="en-IN" sz="3200" spc="-1" strike="noStrike">
+              <a:solidFill>
+                <a:srgbClr val="000000"/>
+              </a:solidFill>
+              <a:latin typeface="Arial"/>
+            </a:endParaRPr>
+          </a:p>
+          <a:p>
+            <a:pPr lvl="1" marL="864000" indent="-324000">
+              <a:spcBef>
+                <a:spcPts val="1134"/>
+              </a:spcBef>
+              <a:buClr>
+                <a:srgbClr val="000000"/>
+              </a:buClr>
+              <a:buSzPct val="75000"/>
+              <a:buFont typeface="Symbol" charset="2"/>
+              <a:buChar char=""/>
+            </a:pPr>
+            <a:r>
+              <a:rPr b="0" lang="en-IN" sz="2800" spc="-1" strike="noStrike">
+                <a:solidFill>
+                  <a:srgbClr val="000000"/>
+                </a:solidFill>
+                <a:latin typeface="Arial"/>
+              </a:rPr>
+              <a:t>Second Outline Level</a:t>
+            </a:r>
+            <a:endParaRPr b="0" lang="en-IN" sz="2800" spc="-1" strike="noStrike">
+              <a:solidFill>
+                <a:srgbClr val="000000"/>
+              </a:solidFill>
+              <a:latin typeface="Arial"/>
+            </a:endParaRPr>
+          </a:p>
+          <a:p>
+            <a:pPr lvl="2" marL="1296000" indent="-288000">
+              <a:spcBef>
+                <a:spcPts val="850"/>
+              </a:spcBef>
+              <a:buClr>
+                <a:srgbClr val="000000"/>
+              </a:buClr>
+              <a:buSzPct val="45000"/>
+              <a:buFont typeface="Wingdings" charset="2"/>
+              <a:buChar char=""/>
+            </a:pPr>
+            <a:r>
+              <a:rPr b="0" lang="en-IN" sz="2400" spc="-1" strike="noStrike">
+                <a:solidFill>
+                  <a:srgbClr val="000000"/>
+                </a:solidFill>
+                <a:latin typeface="Arial"/>
+              </a:rPr>
+              <a:t>Third Outline Level</a:t>
+            </a:r>
+            <a:endParaRPr b="0" lang="en-IN" sz="2400" spc="-1" strike="noStrike">
+              <a:solidFill>
+                <a:srgbClr val="000000"/>
+              </a:solidFill>
+              <a:latin typeface="Arial"/>
+            </a:endParaRPr>
+          </a:p>
+          <a:p>
+            <a:pPr lvl="3" marL="1728000" indent="-216000">
+              <a:spcBef>
+                <a:spcPts val="567"/>
+              </a:spcBef>
+              <a:buClr>
+                <a:srgbClr val="000000"/>
+              </a:buClr>
+              <a:buSzPct val="75000"/>
+              <a:buFont typeface="Symbol" charset="2"/>
+              <a:buChar char=""/>
+            </a:pPr>
+            <a:r>
+              <a:rPr b="0" lang="en-IN" sz="2000" spc="-1" strike="noStrike">
+                <a:solidFill>
+                  <a:srgbClr val="000000"/>
+                </a:solidFill>
+                <a:latin typeface="Arial"/>
+              </a:rPr>
+              <a:t>Fourth Outline Level</a:t>
+            </a:r>
+            <a:endParaRPr b="0" lang="en-IN" sz="2000" spc="-1" strike="noStrike">
+              <a:solidFill>
+                <a:srgbClr val="000000"/>
+              </a:solidFill>
+              <a:latin typeface="Arial"/>
+            </a:endParaRPr>
+          </a:p>
+          <a:p>
+            <a:pPr lvl="4" marL="2160000" indent="-216000">
+              <a:spcBef>
+                <a:spcPts val="283"/>
+              </a:spcBef>
+              <a:buClr>
+                <a:srgbClr val="000000"/>
+              </a:buClr>
+              <a:buSzPct val="45000"/>
+              <a:buFont typeface="Wingdings" charset="2"/>
+              <a:buChar char=""/>
+            </a:pPr>
+            <a:r>
+              <a:rPr b="0" lang="en-IN" sz="2000" spc="-1" strike="noStrike">
+                <a:solidFill>
+                  <a:srgbClr val="000000"/>
+                </a:solidFill>
+                <a:latin typeface="Arial"/>
+              </a:rPr>
+              <a:t>Fifth Outline Level</a:t>
+            </a:r>
+            <a:endParaRPr b="0" lang="en-IN" sz="2000" spc="-1" strike="noStrike">
+              <a:solidFill>
+                <a:srgbClr val="000000"/>
+              </a:solidFill>
+              <a:latin typeface="Arial"/>
+            </a:endParaRPr>
+          </a:p>
+          <a:p>
+            <a:pPr lvl="5" marL="2592000" indent="-216000">
+              <a:spcBef>
+                <a:spcPts val="283"/>
+              </a:spcBef>
+              <a:buClr>
+                <a:srgbClr val="000000"/>
+              </a:buClr>
+              <a:buSzPct val="45000"/>
+              <a:buFont typeface="Wingdings" charset="2"/>
+              <a:buChar char=""/>
+            </a:pPr>
+            <a:r>
+              <a:rPr b="0" lang="en-IN" sz="2000" spc="-1" strike="noStrike">
+                <a:solidFill>
+                  <a:srgbClr val="000000"/>
+                </a:solidFill>
+                <a:latin typeface="Arial"/>
+              </a:rPr>
+              <a:t>Sixth Outline Level</a:t>
+            </a:r>
+            <a:endParaRPr b="0" lang="en-IN" sz="2000" spc="-1" strike="noStrike">
+              <a:solidFill>
+                <a:srgbClr val="000000"/>
+              </a:solidFill>
+              <a:latin typeface="Arial"/>
+            </a:endParaRPr>
+          </a:p>
+          <a:p>
+            <a:pPr lvl="6" marL="3024000" indent="-216000">
+              <a:spcBef>
+                <a:spcPts val="283"/>
+              </a:spcBef>
+              <a:buClr>
+                <a:srgbClr val="000000"/>
+              </a:buClr>
+              <a:buSzPct val="45000"/>
+              <a:buFont typeface="Wingdings" charset="2"/>
+              <a:buChar char=""/>
+            </a:pPr>
+            <a:r>
+              <a:rPr b="0" lang="en-IN" sz="2000" spc="-1" strike="noStrike">
+                <a:solidFill>
+                  <a:srgbClr val="000000"/>
+                </a:solidFill>
+                <a:latin typeface="Arial"/>
+              </a:rPr>
+              <a:t>Seventh Outline Level</a:t>
+            </a:r>
+            <a:endParaRPr b="0" lang="en-IN" sz="2000" spc="-1" strike="noStrike">
+              <a:solidFill>
+                <a:srgbClr val="000000"/>
+              </a:solidFill>
+              <a:latin typeface="Arial"/>
             </a:endParaRPr>
           </a:p>
         </p:txBody>
@@ -5610,7 +5610,7 @@
         <p:spPr>
           <a:xfrm>
             <a:off x="4038480" y="6356520"/>
-            <a:ext cx="4113720" cy="363960"/>
+            <a:ext cx="4113360" cy="363600"/>
           </a:xfrm>
           <a:prstGeom prst="rect">
             <a:avLst/>
@@ -5682,7 +5682,7 @@
         <p:spPr>
           <a:xfrm>
             <a:off x="8610480" y="6356520"/>
-            <a:ext cx="2742120" cy="363960"/>
+            <a:ext cx="2741760" cy="363600"/>
           </a:xfrm>
           <a:prstGeom prst="rect">
             <a:avLst/>
@@ -5723,7 +5723,7 @@
                 <a:tab algn="l" pos="0"/>
               </a:tabLst>
             </a:pPr>
-            <a:fld id="{88E1EF90-7259-4C12-BB41-94756CC549EC}" type="slidenum">
+            <a:fld id="{8E419DF5-CF63-4AB7-B962-09EA42EA0569}" type="slidenum">
               <a:rPr b="0" lang="en-IN" sz="1200" spc="-1" strike="noStrike">
                 <a:solidFill>
                   <a:srgbClr val="8b8b8b"/>
@@ -5754,7 +5754,7 @@
         <p:spPr>
           <a:xfrm>
             <a:off x="838080" y="6356520"/>
-            <a:ext cx="2742120" cy="363960"/>
+            <a:ext cx="2741760" cy="363600"/>
           </a:xfrm>
           <a:prstGeom prst="rect">
             <a:avLst/>
@@ -6124,8 +6124,8 @@
         </p:blipFill>
         <p:spPr>
           <a:xfrm flipH="1">
-            <a:off x="720" y="-16200"/>
-            <a:ext cx="12191040" cy="6856920"/>
+            <a:off x="1080" y="-16200"/>
+            <a:ext cx="12190680" cy="6856560"/>
           </a:xfrm>
           <a:prstGeom prst="rect">
             <a:avLst/>
@@ -6148,7 +6148,7 @@
         <p:spPr>
           <a:xfrm>
             <a:off x="4340520" y="861840"/>
-            <a:ext cx="3510000" cy="929520"/>
+            <a:ext cx="3509640" cy="929160"/>
           </a:xfrm>
           <a:prstGeom prst="rect">
             <a:avLst/>
@@ -6167,7 +6167,7 @@
         <p:spPr>
           <a:xfrm>
             <a:off x="2397600" y="2382840"/>
-            <a:ext cx="7395480" cy="579960"/>
+            <a:ext cx="7395120" cy="579960"/>
           </a:xfrm>
           <a:prstGeom prst="rect">
             <a:avLst/>
@@ -6241,7 +6241,7 @@
         <p:spPr>
           <a:xfrm>
             <a:off x="833040" y="4111200"/>
-            <a:ext cx="6196680" cy="2297160"/>
+            <a:ext cx="6196320" cy="2297160"/>
           </a:xfrm>
           <a:prstGeom prst="rect">
             <a:avLst/>
@@ -6476,8 +6476,8 @@
         </p:blipFill>
         <p:spPr>
           <a:xfrm flipH="1">
-            <a:off x="-131040" y="1080"/>
-            <a:ext cx="12191040" cy="6856920"/>
+            <a:off x="-130680" y="1080"/>
+            <a:ext cx="12190680" cy="6856560"/>
           </a:xfrm>
           <a:prstGeom prst="rect">
             <a:avLst/>
@@ -6496,7 +6496,7 @@
         <p:spPr>
           <a:xfrm>
             <a:off x="2404080" y="383760"/>
-            <a:ext cx="1080" cy="430920"/>
+            <a:ext cx="1440" cy="431280"/>
           </a:xfrm>
           <a:prstGeom prst="straightConnector1">
             <a:avLst/>
@@ -6522,7 +6522,7 @@
         <p:spPr>
           <a:xfrm>
             <a:off x="217440" y="338040"/>
-            <a:ext cx="1962360" cy="520560"/>
+            <a:ext cx="1962000" cy="520200"/>
           </a:xfrm>
           <a:prstGeom prst="rect">
             <a:avLst/>
@@ -6541,7 +6541,7 @@
         <p:spPr>
           <a:xfrm>
             <a:off x="2499480" y="383760"/>
-            <a:ext cx="8817840" cy="510120"/>
+            <a:ext cx="8817480" cy="510120"/>
           </a:xfrm>
           <a:prstGeom prst="rect">
             <a:avLst/>
@@ -6596,13 +6596,13 @@
         </p:nvPicPr>
         <p:blipFill>
           <a:blip r:embed="rId3"/>
-          <a:srcRect l="19024" t="36493" r="13059" b="11006"/>
+          <a:srcRect l="19022" t="36486" r="13057" b="11006"/>
           <a:stretch/>
         </p:blipFill>
         <p:spPr>
           <a:xfrm>
             <a:off x="1260360" y="1980360"/>
-            <a:ext cx="8279640" cy="3599640"/>
+            <a:ext cx="8279280" cy="3599280"/>
           </a:xfrm>
           <a:prstGeom prst="rect">
             <a:avLst/>
@@ -6654,8 +6654,8 @@
         </p:blipFill>
         <p:spPr>
           <a:xfrm flipH="1">
-            <a:off x="1080" y="0"/>
-            <a:ext cx="12191040" cy="6856920"/>
+            <a:off x="1440" y="0"/>
+            <a:ext cx="12190680" cy="6856560"/>
           </a:xfrm>
           <a:prstGeom prst="rect">
             <a:avLst/>
@@ -6674,7 +6674,7 @@
         <p:spPr>
           <a:xfrm>
             <a:off x="2404080" y="383760"/>
-            <a:ext cx="1080" cy="430920"/>
+            <a:ext cx="1440" cy="431280"/>
           </a:xfrm>
           <a:prstGeom prst="straightConnector1">
             <a:avLst/>
@@ -6700,7 +6700,7 @@
         <p:spPr>
           <a:xfrm>
             <a:off x="217440" y="338040"/>
-            <a:ext cx="1962360" cy="520560"/>
+            <a:ext cx="1962000" cy="520200"/>
           </a:xfrm>
           <a:prstGeom prst="rect">
             <a:avLst/>
@@ -6719,7 +6719,7 @@
         <p:spPr>
           <a:xfrm>
             <a:off x="2499480" y="383760"/>
-            <a:ext cx="8817840" cy="510120"/>
+            <a:ext cx="8817480" cy="510120"/>
           </a:xfrm>
           <a:prstGeom prst="rect">
             <a:avLst/>
@@ -6775,7 +6775,7 @@
         <p:spPr>
           <a:xfrm>
             <a:off x="900000" y="1980000"/>
-            <a:ext cx="5025600" cy="2786040"/>
+            <a:ext cx="5025240" cy="2786040"/>
           </a:xfrm>
           <a:prstGeom prst="rect">
             <a:avLst/>
@@ -6967,8 +6967,8 @@
         </p:blipFill>
         <p:spPr>
           <a:xfrm flipH="1">
-            <a:off x="1080" y="-36000"/>
-            <a:ext cx="12191040" cy="6856920"/>
+            <a:off x="1440" y="-36000"/>
+            <a:ext cx="12190680" cy="6856560"/>
           </a:xfrm>
           <a:prstGeom prst="rect">
             <a:avLst/>
@@ -6987,7 +6987,7 @@
         <p:spPr>
           <a:xfrm>
             <a:off x="2404080" y="383760"/>
-            <a:ext cx="1080" cy="430920"/>
+            <a:ext cx="1440" cy="431280"/>
           </a:xfrm>
           <a:prstGeom prst="straightConnector1">
             <a:avLst/>
@@ -7013,7 +7013,7 @@
         <p:spPr>
           <a:xfrm>
             <a:off x="217440" y="338040"/>
-            <a:ext cx="1962360" cy="520560"/>
+            <a:ext cx="1962000" cy="520200"/>
           </a:xfrm>
           <a:prstGeom prst="rect">
             <a:avLst/>
@@ -7032,7 +7032,7 @@
         <p:spPr>
           <a:xfrm>
             <a:off x="2499480" y="383760"/>
-            <a:ext cx="8817840" cy="510120"/>
+            <a:ext cx="8817480" cy="510120"/>
           </a:xfrm>
           <a:prstGeom prst="rect">
             <a:avLst/>
@@ -7082,13 +7082,13 @@
       <p:sp>
         <p:nvSpPr>
           <p:cNvPr id="164" name=""/>
-          <p:cNvSpPr txBox="1"/>
+          <p:cNvSpPr/>
           <p:nvPr/>
         </p:nvSpPr>
         <p:spPr>
           <a:xfrm>
             <a:off x="1089720" y="1993320"/>
-            <a:ext cx="6830280" cy="602280"/>
+            <a:ext cx="6829920" cy="601920"/>
           </a:xfrm>
           <a:prstGeom prst="rect">
             <a:avLst/>
@@ -7098,11 +7098,22 @@
             <a:noFill/>
           </a:ln>
         </p:spPr>
+        <p:style>
+          <a:lnRef idx="0"/>
+          <a:fillRef idx="0"/>
+          <a:effectRef idx="0"/>
+          <a:fontRef idx="minor"/>
+        </p:style>
         <p:txBody>
           <a:bodyPr lIns="90000" rIns="90000" tIns="45000" bIns="45000" anchor="t">
             <a:noAutofit/>
           </a:bodyPr>
           <a:p>
+            <a:pPr>
+              <a:lnSpc>
+                <a:spcPct val="100000"/>
+              </a:lnSpc>
+            </a:pPr>
             <a:r>
               <a:rPr b="0" lang="en-IN" sz="1800" spc="-1" strike="noStrike">
                 <a:solidFill>
@@ -7124,13 +7135,13 @@
       <p:sp>
         <p:nvSpPr>
           <p:cNvPr id="165" name=""/>
-          <p:cNvSpPr txBox="1"/>
+          <p:cNvSpPr/>
           <p:nvPr/>
         </p:nvSpPr>
         <p:spPr>
           <a:xfrm>
             <a:off x="1080000" y="2637720"/>
-            <a:ext cx="10260000" cy="602280"/>
+            <a:ext cx="10259640" cy="601920"/>
           </a:xfrm>
           <a:prstGeom prst="rect">
             <a:avLst/>
@@ -7140,11 +7151,22 @@
             <a:noFill/>
           </a:ln>
         </p:spPr>
+        <p:style>
+          <a:lnRef idx="0"/>
+          <a:fillRef idx="0"/>
+          <a:effectRef idx="0"/>
+          <a:fontRef idx="minor"/>
+        </p:style>
         <p:txBody>
           <a:bodyPr lIns="90000" rIns="90000" tIns="45000" bIns="45000" anchor="t">
             <a:noAutofit/>
           </a:bodyPr>
           <a:p>
+            <a:pPr>
+              <a:lnSpc>
+                <a:spcPct val="100000"/>
+              </a:lnSpc>
+            </a:pPr>
             <a:r>
               <a:rPr b="0" lang="en-IN" sz="1800" spc="-1" strike="noStrike">
                 <a:solidFill>
@@ -7205,8 +7227,8 @@
         </p:blipFill>
         <p:spPr>
           <a:xfrm flipH="1">
-            <a:off x="-4680" y="-6480"/>
-            <a:ext cx="12191040" cy="6856920"/>
+            <a:off x="-4320" y="-6480"/>
+            <a:ext cx="12190680" cy="6856560"/>
           </a:xfrm>
           <a:prstGeom prst="rect">
             <a:avLst/>
@@ -7225,7 +7247,7 @@
         <p:spPr>
           <a:xfrm>
             <a:off x="2404080" y="383760"/>
-            <a:ext cx="1080" cy="430920"/>
+            <a:ext cx="1440" cy="431280"/>
           </a:xfrm>
           <a:prstGeom prst="straightConnector1">
             <a:avLst/>
@@ -7251,7 +7273,7 @@
         <p:spPr>
           <a:xfrm>
             <a:off x="217440" y="338040"/>
-            <a:ext cx="1962360" cy="520560"/>
+            <a:ext cx="1962000" cy="520200"/>
           </a:xfrm>
           <a:prstGeom prst="rect">
             <a:avLst/>
@@ -7270,7 +7292,7 @@
         <p:spPr>
           <a:xfrm>
             <a:off x="698040" y="1503720"/>
-            <a:ext cx="10060560" cy="3674520"/>
+            <a:ext cx="10060200" cy="3673800"/>
           </a:xfrm>
           <a:prstGeom prst="rect">
             <a:avLst/>
@@ -7660,8 +7682,8 @@
         </p:blipFill>
         <p:spPr>
           <a:xfrm flipH="1">
-            <a:off x="0" y="18360"/>
-            <a:ext cx="12191040" cy="6856920"/>
+            <a:off x="1440" y="0"/>
+            <a:ext cx="12190680" cy="6856560"/>
           </a:xfrm>
           <a:prstGeom prst="rect">
             <a:avLst/>
@@ -7680,7 +7702,7 @@
         <p:spPr>
           <a:xfrm>
             <a:off x="2404080" y="383760"/>
-            <a:ext cx="1080" cy="430920"/>
+            <a:ext cx="1440" cy="431280"/>
           </a:xfrm>
           <a:prstGeom prst="straightConnector1">
             <a:avLst/>
@@ -7706,7 +7728,7 @@
         <p:spPr>
           <a:xfrm>
             <a:off x="217440" y="338040"/>
-            <a:ext cx="1962360" cy="520560"/>
+            <a:ext cx="1962000" cy="520200"/>
           </a:xfrm>
           <a:prstGeom prst="rect">
             <a:avLst/>
@@ -7724,8 +7746,8 @@
         </p:nvSpPr>
         <p:spPr>
           <a:xfrm rot="21599400">
-            <a:off x="720000" y="1439640"/>
-            <a:ext cx="5579280" cy="679320"/>
+            <a:off x="720000" y="1439280"/>
+            <a:ext cx="5578920" cy="678960"/>
           </a:xfrm>
           <a:prstGeom prst="rect">
             <a:avLst/>
@@ -7782,7 +7804,7 @@
         <p:spPr>
           <a:xfrm>
             <a:off x="2499480" y="383760"/>
-            <a:ext cx="8817840" cy="455400"/>
+            <a:ext cx="8817480" cy="455400"/>
           </a:xfrm>
           <a:prstGeom prst="rect">
             <a:avLst/>
@@ -7837,8 +7859,8 @@
         </p:nvSpPr>
         <p:spPr>
           <a:xfrm rot="21576600">
-            <a:off x="728280" y="1825200"/>
-            <a:ext cx="7379280" cy="2341800"/>
+            <a:off x="727920" y="1825200"/>
+            <a:ext cx="7378920" cy="2341440"/>
           </a:xfrm>
           <a:prstGeom prst="rect">
             <a:avLst/>
@@ -7872,7 +7894,7 @@
                 <a:latin typeface="Arial"/>
                 <a:ea typeface="DejaVu Sans"/>
               </a:rPr>
-              <a:t>The api is created using spring boot to demonstrate creation of REST API and fully automating the build and deployment on docker using jenkins CICD</a:t>
+              <a:t>The api is created using spring boot to demonstrate creation of REST API and fully automating the build and deployment on kubernetes using jenkins CICD</a:t>
             </a:r>
             <a:endParaRPr b="0" lang="en-IN" sz="2800" spc="-1" strike="noStrike">
               <a:solidFill>
@@ -7891,13 +7913,12 @@
         </p:nvPicPr>
         <p:blipFill>
           <a:blip r:embed="rId3"/>
-          <a:srcRect l="0" t="11521" r="46929" b="0"/>
           <a:stretch/>
         </p:blipFill>
         <p:spPr>
           <a:xfrm>
-            <a:off x="7824240" y="2491920"/>
-            <a:ext cx="4140000" cy="3851640"/>
+            <a:off x="5940000" y="3240000"/>
+            <a:ext cx="5990760" cy="3342960"/>
           </a:xfrm>
           <a:prstGeom prst="rect">
             <a:avLst/>
@@ -7949,8 +7970,8 @@
         </p:blipFill>
         <p:spPr>
           <a:xfrm flipH="1">
-            <a:off x="-131040" y="0"/>
-            <a:ext cx="12191040" cy="6856920"/>
+            <a:off x="-130680" y="0"/>
+            <a:ext cx="12190680" cy="6856560"/>
           </a:xfrm>
           <a:prstGeom prst="rect">
             <a:avLst/>
@@ -7969,7 +7990,7 @@
         <p:spPr>
           <a:xfrm>
             <a:off x="2404080" y="383760"/>
-            <a:ext cx="1080" cy="430920"/>
+            <a:ext cx="1440" cy="431280"/>
           </a:xfrm>
           <a:prstGeom prst="straightConnector1">
             <a:avLst/>
@@ -7995,7 +8016,7 @@
         <p:spPr>
           <a:xfrm>
             <a:off x="217440" y="338040"/>
-            <a:ext cx="1962360" cy="520560"/>
+            <a:ext cx="1962000" cy="520200"/>
           </a:xfrm>
           <a:prstGeom prst="rect">
             <a:avLst/>
@@ -8014,7 +8035,7 @@
         <p:spPr>
           <a:xfrm>
             <a:off x="2499480" y="383760"/>
-            <a:ext cx="8817840" cy="455400"/>
+            <a:ext cx="8817480" cy="455400"/>
           </a:xfrm>
           <a:prstGeom prst="rect">
             <a:avLst/>
@@ -8070,7 +8091,7 @@
         <p:spPr>
           <a:xfrm>
             <a:off x="1030320" y="1440000"/>
-            <a:ext cx="6888960" cy="4136760"/>
+            <a:ext cx="6888600" cy="4136760"/>
           </a:xfrm>
           <a:prstGeom prst="rect">
             <a:avLst/>
@@ -8221,7 +8242,7 @@
                 <a:latin typeface="Times New Roman"/>
                 <a:ea typeface="Arial"/>
               </a:rPr>
-              <a:t>The docker Images are created, pushed to docker-hub and deployed using shell script on jenkins</a:t>
+              <a:t>The docker Images are created, pushed to docker-hub and deployed on kubernetes using shell script on jenkins</a:t>
             </a:r>
             <a:endParaRPr b="0" lang="en-IN" sz="2100" spc="-1" strike="noStrike">
               <a:solidFill>
@@ -8274,8 +8295,8 @@
         </p:blipFill>
         <p:spPr>
           <a:xfrm flipH="1">
-            <a:off x="1080" y="0"/>
-            <a:ext cx="12191040" cy="6856920"/>
+            <a:off x="1440" y="0"/>
+            <a:ext cx="12190680" cy="6856560"/>
           </a:xfrm>
           <a:prstGeom prst="rect">
             <a:avLst/>
@@ -8294,7 +8315,7 @@
         <p:spPr>
           <a:xfrm>
             <a:off x="2404080" y="383760"/>
-            <a:ext cx="1080" cy="430920"/>
+            <a:ext cx="1440" cy="431280"/>
           </a:xfrm>
           <a:prstGeom prst="straightConnector1">
             <a:avLst/>
@@ -8320,7 +8341,7 @@
         <p:spPr>
           <a:xfrm>
             <a:off x="217440" y="338040"/>
-            <a:ext cx="1962360" cy="520560"/>
+            <a:ext cx="1962000" cy="520200"/>
           </a:xfrm>
           <a:prstGeom prst="rect">
             <a:avLst/>
@@ -8339,7 +8360,7 @@
         <p:spPr>
           <a:xfrm>
             <a:off x="2499480" y="383760"/>
-            <a:ext cx="8817840" cy="510120"/>
+            <a:ext cx="8817480" cy="510120"/>
           </a:xfrm>
           <a:prstGeom prst="rect">
             <a:avLst/>
@@ -8394,8 +8415,8 @@
         </p:nvSpPr>
         <p:spPr>
           <a:xfrm rot="21592800">
-            <a:off x="1262880" y="1844640"/>
-            <a:ext cx="5753880" cy="3656880"/>
+            <a:off x="1262520" y="1844640"/>
+            <a:ext cx="5753520" cy="3656520"/>
           </a:xfrm>
           <a:prstGeom prst="rect">
             <a:avLst/>
@@ -8668,6 +8689,35 @@
                 <a:ea typeface="DejaVu Sans"/>
               </a:rPr>
               <a:t>Docker</a:t>
+            </a:r>
+            <a:endParaRPr b="0" lang="en-IN" sz="2800" spc="-1" strike="noStrike">
+              <a:solidFill>
+                <a:srgbClr val="000000"/>
+              </a:solidFill>
+              <a:latin typeface="Arial"/>
+            </a:endParaRPr>
+          </a:p>
+          <a:p>
+            <a:pPr marL="216000" indent="-216000">
+              <a:lnSpc>
+                <a:spcPct val="100000"/>
+              </a:lnSpc>
+              <a:buClr>
+                <a:srgbClr val="000000"/>
+              </a:buClr>
+              <a:buSzPct val="45000"/>
+              <a:buFont typeface="Wingdings" charset="2"/>
+              <a:buChar char=""/>
+            </a:pPr>
+            <a:r>
+              <a:rPr b="0" lang="en-IN" sz="2800" spc="-1" strike="noStrike">
+                <a:solidFill>
+                  <a:srgbClr val="000000"/>
+                </a:solidFill>
+                <a:latin typeface="Arial"/>
+                <a:ea typeface="DejaVu Sans"/>
+              </a:rPr>
+              <a:t>Kubernetes</a:t>
             </a:r>
             <a:endParaRPr b="0" lang="en-IN" sz="2800" spc="-1" strike="noStrike">
               <a:solidFill>
@@ -8720,8 +8770,8 @@
         </p:blipFill>
         <p:spPr>
           <a:xfrm flipH="1">
-            <a:off x="48960" y="1080"/>
-            <a:ext cx="12191040" cy="6856920"/>
+            <a:off x="49320" y="1080"/>
+            <a:ext cx="12190680" cy="6856560"/>
           </a:xfrm>
           <a:prstGeom prst="rect">
             <a:avLst/>
@@ -8740,7 +8790,7 @@
         <p:spPr>
           <a:xfrm>
             <a:off x="2404080" y="383760"/>
-            <a:ext cx="1080" cy="430920"/>
+            <a:ext cx="1440" cy="431280"/>
           </a:xfrm>
           <a:prstGeom prst="straightConnector1">
             <a:avLst/>
@@ -8766,7 +8816,7 @@
         <p:spPr>
           <a:xfrm>
             <a:off x="217440" y="338040"/>
-            <a:ext cx="1962360" cy="520560"/>
+            <a:ext cx="1962000" cy="520200"/>
           </a:xfrm>
           <a:prstGeom prst="rect">
             <a:avLst/>
@@ -8785,7 +8835,7 @@
         <p:spPr>
           <a:xfrm>
             <a:off x="2499480" y="383760"/>
-            <a:ext cx="8817840" cy="510840"/>
+            <a:ext cx="8817480" cy="510120"/>
           </a:xfrm>
           <a:prstGeom prst="rect">
             <a:avLst/>
@@ -8840,13 +8890,13 @@
         </p:nvPicPr>
         <p:blipFill>
           <a:blip r:embed="rId3"/>
-          <a:srcRect l="26406" t="12784" r="33730" b="34628"/>
+          <a:srcRect l="26404" t="12784" r="33726" b="34625"/>
           <a:stretch/>
         </p:blipFill>
         <p:spPr>
           <a:xfrm>
             <a:off x="1440720" y="1614240"/>
-            <a:ext cx="4859280" cy="4505760"/>
+            <a:ext cx="4858920" cy="4505400"/>
           </a:xfrm>
           <a:prstGeom prst="rect">
             <a:avLst/>
@@ -8864,13 +8914,13 @@
         </p:nvPicPr>
         <p:blipFill>
           <a:blip r:embed="rId4"/>
-          <a:srcRect l="2783" t="15500" r="73591" b="24129"/>
+          <a:srcRect l="2783" t="15500" r="73583" b="24126"/>
           <a:stretch/>
         </p:blipFill>
         <p:spPr>
           <a:xfrm>
             <a:off x="7200000" y="1462320"/>
-            <a:ext cx="3240000" cy="4657680"/>
+            <a:ext cx="3239640" cy="4657320"/>
           </a:xfrm>
           <a:prstGeom prst="rect">
             <a:avLst/>
@@ -8922,8 +8972,8 @@
         </p:blipFill>
         <p:spPr>
           <a:xfrm flipH="1">
-            <a:off x="1080" y="0"/>
-            <a:ext cx="12191040" cy="6856920"/>
+            <a:off x="1440" y="0"/>
+            <a:ext cx="12190680" cy="6856560"/>
           </a:xfrm>
           <a:prstGeom prst="rect">
             <a:avLst/>
@@ -8942,7 +8992,7 @@
         <p:spPr>
           <a:xfrm>
             <a:off x="2404080" y="383760"/>
-            <a:ext cx="1080" cy="430920"/>
+            <a:ext cx="1440" cy="431280"/>
           </a:xfrm>
           <a:prstGeom prst="straightConnector1">
             <a:avLst/>
@@ -8968,7 +9018,7 @@
         <p:spPr>
           <a:xfrm>
             <a:off x="217440" y="338040"/>
-            <a:ext cx="1962360" cy="520560"/>
+            <a:ext cx="1962000" cy="520200"/>
           </a:xfrm>
           <a:prstGeom prst="rect">
             <a:avLst/>
@@ -8987,7 +9037,7 @@
         <p:spPr>
           <a:xfrm>
             <a:off x="2499480" y="383760"/>
-            <a:ext cx="8817840" cy="455400"/>
+            <a:ext cx="8817480" cy="455400"/>
           </a:xfrm>
           <a:prstGeom prst="rect">
             <a:avLst/>
@@ -9043,7 +9093,7 @@
         <p:spPr>
           <a:xfrm>
             <a:off x="1795680" y="2027880"/>
-            <a:ext cx="1434960" cy="1139400"/>
+            <a:ext cx="1434600" cy="1139040"/>
           </a:xfrm>
           <a:prstGeom prst="rect">
             <a:avLst/>
@@ -9101,7 +9151,7 @@
         <p:spPr>
           <a:xfrm>
             <a:off x="8564400" y="2027880"/>
-            <a:ext cx="1640160" cy="1139400"/>
+            <a:ext cx="1639800" cy="1139040"/>
           </a:xfrm>
           <a:prstGeom prst="rect">
             <a:avLst/>
@@ -9159,7 +9209,7 @@
         <p:spPr>
           <a:xfrm>
             <a:off x="6103080" y="2027880"/>
-            <a:ext cx="1434960" cy="1139400"/>
+            <a:ext cx="1434600" cy="1139040"/>
           </a:xfrm>
           <a:prstGeom prst="rect">
             <a:avLst/>
@@ -9217,7 +9267,7 @@
         <p:spPr>
           <a:xfrm>
             <a:off x="3846960" y="2027880"/>
-            <a:ext cx="1434960" cy="1139400"/>
+            <a:ext cx="1434600" cy="1139040"/>
           </a:xfrm>
           <a:prstGeom prst="rect">
             <a:avLst/>
@@ -9443,7 +9493,7 @@
         <p:spPr>
           <a:xfrm>
             <a:off x="8794800" y="4007880"/>
-            <a:ext cx="1640160" cy="1139400"/>
+            <a:ext cx="1639800" cy="1139040"/>
           </a:xfrm>
           <a:prstGeom prst="rect">
             <a:avLst/>
@@ -9614,7 +9664,7 @@
         <p:spPr>
           <a:xfrm>
             <a:off x="3846960" y="3852000"/>
-            <a:ext cx="1434960" cy="1367280"/>
+            <a:ext cx="1434600" cy="1366920"/>
           </a:xfrm>
           <a:prstGeom prst="rect">
             <a:avLst/>
@@ -9714,7 +9764,7 @@
         <p:spPr>
           <a:xfrm>
             <a:off x="1795680" y="3852000"/>
-            <a:ext cx="1640160" cy="1367280"/>
+            <a:ext cx="1639800" cy="1366920"/>
           </a:xfrm>
           <a:prstGeom prst="rect">
             <a:avLst/>
@@ -9886,7 +9936,7 @@
         <p:spPr>
           <a:xfrm>
             <a:off x="3436560" y="4417200"/>
-            <a:ext cx="264600" cy="573840"/>
+            <a:ext cx="264240" cy="573480"/>
           </a:xfrm>
           <a:prstGeom prst="rect">
             <a:avLst/>
@@ -9940,7 +9990,7 @@
         <p:spPr>
           <a:xfrm>
             <a:off x="1945800" y="3114360"/>
-            <a:ext cx="264600" cy="573840"/>
+            <a:ext cx="264240" cy="573480"/>
           </a:xfrm>
           <a:prstGeom prst="rect">
             <a:avLst/>
@@ -10036,7 +10086,7 @@
         <p:spPr>
           <a:xfrm>
             <a:off x="5693040" y="2706120"/>
-            <a:ext cx="264600" cy="573840"/>
+            <a:ext cx="264240" cy="573480"/>
           </a:xfrm>
           <a:prstGeom prst="rect">
             <a:avLst/>
@@ -10090,7 +10140,7 @@
         <p:spPr>
           <a:xfrm>
             <a:off x="4196880" y="3168000"/>
-            <a:ext cx="264600" cy="573840"/>
+            <a:ext cx="264240" cy="573480"/>
           </a:xfrm>
           <a:prstGeom prst="rect">
             <a:avLst/>
@@ -10177,8 +10227,8 @@
         </p:blipFill>
         <p:spPr>
           <a:xfrm flipH="1">
-            <a:off x="1080" y="0"/>
-            <a:ext cx="12191040" cy="6856920"/>
+            <a:off x="1440" y="0"/>
+            <a:ext cx="12190680" cy="6856560"/>
           </a:xfrm>
           <a:prstGeom prst="rect">
             <a:avLst/>
@@ -10197,7 +10247,7 @@
         <p:spPr>
           <a:xfrm>
             <a:off x="2404080" y="383760"/>
-            <a:ext cx="1080" cy="430920"/>
+            <a:ext cx="1440" cy="431280"/>
           </a:xfrm>
           <a:prstGeom prst="straightConnector1">
             <a:avLst/>
@@ -10223,7 +10273,7 @@
         <p:spPr>
           <a:xfrm>
             <a:off x="217440" y="338040"/>
-            <a:ext cx="1962360" cy="520560"/>
+            <a:ext cx="1962000" cy="520200"/>
           </a:xfrm>
           <a:prstGeom prst="rect">
             <a:avLst/>
@@ -10242,7 +10292,7 @@
         <p:spPr>
           <a:xfrm>
             <a:off x="2499480" y="383760"/>
-            <a:ext cx="8817840" cy="510840"/>
+            <a:ext cx="8817480" cy="510120"/>
           </a:xfrm>
           <a:prstGeom prst="rect">
             <a:avLst/>
@@ -10297,13 +10347,13 @@
         </p:nvPicPr>
         <p:blipFill>
           <a:blip r:embed="rId3"/>
-          <a:srcRect l="27882" t="15500" r="35205" b="34628"/>
+          <a:srcRect l="27878" t="15500" r="35201" b="34625"/>
           <a:stretch/>
         </p:blipFill>
         <p:spPr>
           <a:xfrm>
             <a:off x="720000" y="1800360"/>
-            <a:ext cx="4499640" cy="3419640"/>
+            <a:ext cx="4499280" cy="3419280"/>
           </a:xfrm>
           <a:prstGeom prst="rect">
             <a:avLst/>
@@ -10321,13 +10371,13 @@
         </p:nvPicPr>
         <p:blipFill>
           <a:blip r:embed="rId4"/>
-          <a:srcRect l="27882" t="12871" r="26344" b="47745"/>
+          <a:srcRect l="27878" t="12868" r="26341" b="47738"/>
           <a:stretch/>
         </p:blipFill>
         <p:spPr>
           <a:xfrm>
             <a:off x="5400360" y="1800000"/>
-            <a:ext cx="5579640" cy="3420000"/>
+            <a:ext cx="5579280" cy="3419640"/>
           </a:xfrm>
           <a:prstGeom prst="rect">
             <a:avLst/>
@@ -10379,8 +10429,8 @@
         </p:blipFill>
         <p:spPr>
           <a:xfrm flipH="1">
-            <a:off x="1080" y="-36000"/>
-            <a:ext cx="12191040" cy="6856920"/>
+            <a:off x="1440" y="-36000"/>
+            <a:ext cx="12190680" cy="6856560"/>
           </a:xfrm>
           <a:prstGeom prst="rect">
             <a:avLst/>
@@ -10399,7 +10449,7 @@
         <p:spPr>
           <a:xfrm>
             <a:off x="2404080" y="383760"/>
-            <a:ext cx="1080" cy="430920"/>
+            <a:ext cx="1440" cy="431280"/>
           </a:xfrm>
           <a:prstGeom prst="straightConnector1">
             <a:avLst/>
@@ -10425,7 +10475,7 @@
         <p:spPr>
           <a:xfrm>
             <a:off x="217440" y="338040"/>
-            <a:ext cx="1962360" cy="520560"/>
+            <a:ext cx="1962000" cy="520200"/>
           </a:xfrm>
           <a:prstGeom prst="rect">
             <a:avLst/>
@@ -10444,7 +10494,7 @@
         <p:spPr>
           <a:xfrm>
             <a:off x="2499480" y="360000"/>
-            <a:ext cx="8817840" cy="510120"/>
+            <a:ext cx="8817480" cy="510120"/>
           </a:xfrm>
           <a:prstGeom prst="rect">
             <a:avLst/>
@@ -10500,7 +10550,7 @@
         <p:spPr>
           <a:xfrm>
             <a:off x="670320" y="1440000"/>
-            <a:ext cx="5808960" cy="2786760"/>
+            <a:ext cx="5808600" cy="2786400"/>
           </a:xfrm>
           <a:prstGeom prst="rect">
             <a:avLst/>
@@ -10531,6 +10581,7 @@
                 <a:srgbClr val="000000"/>
               </a:solidFill>
               <a:latin typeface="Arial"/>
+              <a:ea typeface="DejaVu Sans"/>
             </a:endParaRPr>
           </a:p>
         </p:txBody>
@@ -10543,13 +10594,13 @@
         </p:nvPicPr>
         <p:blipFill>
           <a:blip r:embed="rId3"/>
-          <a:srcRect l="27882" t="10250" r="32252" b="73995"/>
+          <a:srcRect l="27878" t="10250" r="32248" b="73984"/>
           <a:stretch/>
         </p:blipFill>
         <p:spPr>
           <a:xfrm>
             <a:off x="2520000" y="5040000"/>
-            <a:ext cx="6480000" cy="1439640"/>
+            <a:ext cx="6479640" cy="1439280"/>
           </a:xfrm>
           <a:prstGeom prst="rect">
             <a:avLst/>
@@ -10567,13 +10618,13 @@
         </p:nvPicPr>
         <p:blipFill>
           <a:blip r:embed="rId4"/>
-          <a:srcRect l="-167" t="12441" r="33728" b="37249"/>
+          <a:srcRect l="-167" t="12441" r="33724" b="37242"/>
           <a:stretch/>
         </p:blipFill>
         <p:spPr>
           <a:xfrm>
             <a:off x="1800360" y="1260000"/>
-            <a:ext cx="8099640" cy="3449520"/>
+            <a:ext cx="8099280" cy="3449160"/>
           </a:xfrm>
           <a:prstGeom prst="rect">
             <a:avLst/>

</xml_diff>